<commit_message>
Small pptx changes, added conn str snippet.
</commit_message>
<xml_diff>
--- a/docs/001 H - O sebi.pptx
+++ b/docs/001 H - O sebi.pptx
@@ -244,7 +244,7 @@
           <a:p>
             <a:fld id="{9A626F77-8370-4628-A61B-1307895DC83A}" type="datetimeFigureOut">
               <a:rPr lang="en-GB" smtClean="0"/>
-              <a:t>03/05/2014</a:t>
+              <a:t>08/05/2014</a:t>
             </a:fld>
             <a:endParaRPr lang="en-GB"/>
           </a:p>
@@ -414,7 +414,7 @@
           <a:p>
             <a:fld id="{9A626F77-8370-4628-A61B-1307895DC83A}" type="datetimeFigureOut">
               <a:rPr lang="en-GB" smtClean="0"/>
-              <a:t>03/05/2014</a:t>
+              <a:t>08/05/2014</a:t>
             </a:fld>
             <a:endParaRPr lang="en-GB"/>
           </a:p>
@@ -594,7 +594,7 @@
           <a:p>
             <a:fld id="{9A626F77-8370-4628-A61B-1307895DC83A}" type="datetimeFigureOut">
               <a:rPr lang="en-GB" smtClean="0"/>
-              <a:t>03/05/2014</a:t>
+              <a:t>08/05/2014</a:t>
             </a:fld>
             <a:endParaRPr lang="en-GB"/>
           </a:p>
@@ -764,7 +764,7 @@
           <a:p>
             <a:fld id="{9A626F77-8370-4628-A61B-1307895DC83A}" type="datetimeFigureOut">
               <a:rPr lang="en-GB" smtClean="0"/>
-              <a:t>03/05/2014</a:t>
+              <a:t>08/05/2014</a:t>
             </a:fld>
             <a:endParaRPr lang="en-GB"/>
           </a:p>
@@ -1010,7 +1010,7 @@
           <a:p>
             <a:fld id="{9A626F77-8370-4628-A61B-1307895DC83A}" type="datetimeFigureOut">
               <a:rPr lang="en-GB" smtClean="0"/>
-              <a:t>03/05/2014</a:t>
+              <a:t>08/05/2014</a:t>
             </a:fld>
             <a:endParaRPr lang="en-GB"/>
           </a:p>
@@ -1242,7 +1242,7 @@
           <a:p>
             <a:fld id="{9A626F77-8370-4628-A61B-1307895DC83A}" type="datetimeFigureOut">
               <a:rPr lang="en-GB" smtClean="0"/>
-              <a:t>03/05/2014</a:t>
+              <a:t>08/05/2014</a:t>
             </a:fld>
             <a:endParaRPr lang="en-GB"/>
           </a:p>
@@ -1609,7 +1609,7 @@
           <a:p>
             <a:fld id="{9A626F77-8370-4628-A61B-1307895DC83A}" type="datetimeFigureOut">
               <a:rPr lang="en-GB" smtClean="0"/>
-              <a:t>03/05/2014</a:t>
+              <a:t>08/05/2014</a:t>
             </a:fld>
             <a:endParaRPr lang="en-GB"/>
           </a:p>
@@ -1727,7 +1727,7 @@
           <a:p>
             <a:fld id="{9A626F77-8370-4628-A61B-1307895DC83A}" type="datetimeFigureOut">
               <a:rPr lang="en-GB" smtClean="0"/>
-              <a:t>03/05/2014</a:t>
+              <a:t>08/05/2014</a:t>
             </a:fld>
             <a:endParaRPr lang="en-GB"/>
           </a:p>
@@ -1822,7 +1822,7 @@
           <a:p>
             <a:fld id="{9A626F77-8370-4628-A61B-1307895DC83A}" type="datetimeFigureOut">
               <a:rPr lang="en-GB" smtClean="0"/>
-              <a:t>03/05/2014</a:t>
+              <a:t>08/05/2014</a:t>
             </a:fld>
             <a:endParaRPr lang="en-GB"/>
           </a:p>
@@ -2099,7 +2099,7 @@
           <a:p>
             <a:fld id="{9A626F77-8370-4628-A61B-1307895DC83A}" type="datetimeFigureOut">
               <a:rPr lang="en-GB" smtClean="0"/>
-              <a:t>03/05/2014</a:t>
+              <a:t>08/05/2014</a:t>
             </a:fld>
             <a:endParaRPr lang="en-GB"/>
           </a:p>
@@ -2352,7 +2352,7 @@
           <a:p>
             <a:fld id="{9A626F77-8370-4628-A61B-1307895DC83A}" type="datetimeFigureOut">
               <a:rPr lang="en-GB" smtClean="0"/>
-              <a:t>03/05/2014</a:t>
+              <a:t>08/05/2014</a:t>
             </a:fld>
             <a:endParaRPr lang="en-GB"/>
           </a:p>
@@ -2565,7 +2565,7 @@
           <a:p>
             <a:fld id="{9A626F77-8370-4628-A61B-1307895DC83A}" type="datetimeFigureOut">
               <a:rPr lang="en-GB" smtClean="0"/>
-              <a:t>03/05/2014</a:t>
+              <a:t>08/05/2014</a:t>
             </a:fld>
             <a:endParaRPr lang="en-GB"/>
           </a:p>
@@ -3008,6 +3008,22 @@
           <a:bodyPr/>
           <a:lstStyle/>
           <a:p>
+            <a:r>
+              <a:rPr lang="en-GB" dirty="0" err="1" smtClean="0"/>
+              <a:t>tko</a:t>
+            </a:r>
+            <a:r>
+              <a:rPr lang="en-GB" dirty="0" smtClean="0"/>
+              <a:t> je </a:t>
+            </a:r>
+            <a:r>
+              <a:rPr lang="en-GB" dirty="0" err="1" smtClean="0"/>
+              <a:t>taj</a:t>
+            </a:r>
+            <a:r>
+              <a:rPr lang="en-GB" dirty="0" smtClean="0"/>
+              <a:t> tip?</a:t>
+            </a:r>
             <a:endParaRPr lang="en-GB" dirty="0"/>
           </a:p>
         </p:txBody>
@@ -3066,7 +3082,11 @@
           <a:p>
             <a:r>
               <a:rPr lang="en-GB" dirty="0" smtClean="0"/>
-              <a:t>Who’s that guy</a:t>
+              <a:t>Who’s that </a:t>
+            </a:r>
+            <a:r>
+              <a:rPr lang="en-GB" dirty="0" smtClean="0"/>
+              <a:t>guy</a:t>
             </a:r>
             <a:endParaRPr lang="en-GB" dirty="0"/>
           </a:p>

</xml_diff>